<commit_message>
ppt to pdf presentation
</commit_message>
<xml_diff>
--- a/docs/group09_2nd_modified.pptx
+++ b/docs/group09_2nd_modified.pptx
@@ -266,7 +266,7 @@
           <a:p>
             <a:fld id="{52728BA5-EC20-4827-BD7C-23A0DAF65813}" type="datetimeFigureOut">
               <a:rPr lang="en-US" smtClean="0"/>
-              <a:t>2020-01-10</a:t>
+              <a:t>2020-01-22</a:t>
             </a:fld>
             <a:endParaRPr lang="en-US"/>
           </a:p>
@@ -464,7 +464,7 @@
           <a:p>
             <a:fld id="{52728BA5-EC20-4827-BD7C-23A0DAF65813}" type="datetimeFigureOut">
               <a:rPr lang="en-US" smtClean="0"/>
-              <a:t>2020-01-10</a:t>
+              <a:t>2020-01-22</a:t>
             </a:fld>
             <a:endParaRPr lang="en-US"/>
           </a:p>
@@ -672,7 +672,7 @@
           <a:p>
             <a:fld id="{52728BA5-EC20-4827-BD7C-23A0DAF65813}" type="datetimeFigureOut">
               <a:rPr lang="en-US" smtClean="0"/>
-              <a:t>2020-01-10</a:t>
+              <a:t>2020-01-22</a:t>
             </a:fld>
             <a:endParaRPr lang="en-US"/>
           </a:p>
@@ -870,7 +870,7 @@
           <a:p>
             <a:fld id="{52728BA5-EC20-4827-BD7C-23A0DAF65813}" type="datetimeFigureOut">
               <a:rPr lang="en-US" smtClean="0"/>
-              <a:t>2020-01-10</a:t>
+              <a:t>2020-01-22</a:t>
             </a:fld>
             <a:endParaRPr lang="en-US"/>
           </a:p>
@@ -1145,7 +1145,7 @@
           <a:p>
             <a:fld id="{52728BA5-EC20-4827-BD7C-23A0DAF65813}" type="datetimeFigureOut">
               <a:rPr lang="en-US" smtClean="0"/>
-              <a:t>2020-01-10</a:t>
+              <a:t>2020-01-22</a:t>
             </a:fld>
             <a:endParaRPr lang="en-US"/>
           </a:p>
@@ -1410,7 +1410,7 @@
           <a:p>
             <a:fld id="{52728BA5-EC20-4827-BD7C-23A0DAF65813}" type="datetimeFigureOut">
               <a:rPr lang="en-US" smtClean="0"/>
-              <a:t>2020-01-10</a:t>
+              <a:t>2020-01-22</a:t>
             </a:fld>
             <a:endParaRPr lang="en-US"/>
           </a:p>
@@ -1822,7 +1822,7 @@
           <a:p>
             <a:fld id="{52728BA5-EC20-4827-BD7C-23A0DAF65813}" type="datetimeFigureOut">
               <a:rPr lang="en-US" smtClean="0"/>
-              <a:t>2020-01-10</a:t>
+              <a:t>2020-01-22</a:t>
             </a:fld>
             <a:endParaRPr lang="en-US"/>
           </a:p>
@@ -1963,7 +1963,7 @@
           <a:p>
             <a:fld id="{52728BA5-EC20-4827-BD7C-23A0DAF65813}" type="datetimeFigureOut">
               <a:rPr lang="en-US" smtClean="0"/>
-              <a:t>2020-01-10</a:t>
+              <a:t>2020-01-22</a:t>
             </a:fld>
             <a:endParaRPr lang="en-US"/>
           </a:p>
@@ -2076,7 +2076,7 @@
           <a:p>
             <a:fld id="{52728BA5-EC20-4827-BD7C-23A0DAF65813}" type="datetimeFigureOut">
               <a:rPr lang="en-US" smtClean="0"/>
-              <a:t>2020-01-10</a:t>
+              <a:t>2020-01-22</a:t>
             </a:fld>
             <a:endParaRPr lang="en-US"/>
           </a:p>
@@ -2387,7 +2387,7 @@
           <a:p>
             <a:fld id="{52728BA5-EC20-4827-BD7C-23A0DAF65813}" type="datetimeFigureOut">
               <a:rPr lang="en-US" smtClean="0"/>
-              <a:t>2020-01-10</a:t>
+              <a:t>2020-01-22</a:t>
             </a:fld>
             <a:endParaRPr lang="en-US"/>
           </a:p>
@@ -2675,7 +2675,7 @@
           <a:p>
             <a:fld id="{52728BA5-EC20-4827-BD7C-23A0DAF65813}" type="datetimeFigureOut">
               <a:rPr lang="en-US" smtClean="0"/>
-              <a:t>2020-01-10</a:t>
+              <a:t>2020-01-22</a:t>
             </a:fld>
             <a:endParaRPr lang="en-US"/>
           </a:p>
@@ -2916,7 +2916,7 @@
           <a:p>
             <a:fld id="{52728BA5-EC20-4827-BD7C-23A0DAF65813}" type="datetimeFigureOut">
               <a:rPr lang="en-US" smtClean="0"/>
-              <a:t>2020-01-10</a:t>
+              <a:t>2020-01-22</a:t>
             </a:fld>
             <a:endParaRPr lang="en-US"/>
           </a:p>
@@ -3634,7 +3634,7 @@
         <p:spPr/>
         <p:txBody>
           <a:bodyPr>
-            <a:normAutofit fontScale="85000" lnSpcReduction="20000"/>
+            <a:normAutofit fontScale="92500" lnSpcReduction="20000"/>
           </a:bodyPr>
           <a:lstStyle/>
           <a:p>
@@ -3643,51 +3643,7 @@
               <a:rPr lang="en-US" sz="4000" dirty="0">
                 <a:latin typeface="+mj-lt"/>
               </a:rPr>
-              <a:t>Location </a:t>
-            </a:r>
-            <a:r>
-              <a:rPr lang="en-US" sz="4000" dirty="0">
-                <a:solidFill>
-                  <a:schemeClr val="tx1">
-                    <a:lumMod val="75000"/>
-                    <a:lumOff val="25000"/>
-                  </a:schemeClr>
-                </a:solidFill>
-              </a:rPr>
-              <a:t>(If user permits the location (credit to </a:t>
-            </a:r>
-            <a:r>
-              <a:rPr lang="en-US" sz="4000" dirty="0">
-                <a:solidFill>
-                  <a:schemeClr val="accent4">
-                    <a:lumMod val="60000"/>
-                    <a:lumOff val="40000"/>
-                  </a:schemeClr>
-                </a:solidFill>
-              </a:rPr>
-              <a:t>Dominik </a:t>
-            </a:r>
-            <a:r>
-              <a:rPr lang="en-US" sz="4000" dirty="0" err="1">
-                <a:solidFill>
-                  <a:schemeClr val="accent4">
-                    <a:lumMod val="60000"/>
-                    <a:lumOff val="40000"/>
-                  </a:schemeClr>
-                </a:solidFill>
-              </a:rPr>
-              <a:t>Florencki</a:t>
-            </a:r>
-            <a:r>
-              <a:rPr lang="en-US" sz="4000" dirty="0">
-                <a:solidFill>
-                  <a:schemeClr val="tx1">
-                    <a:lumMod val="75000"/>
-                    <a:lumOff val="25000"/>
-                  </a:schemeClr>
-                </a:solidFill>
-              </a:rPr>
-              <a:t>)) </a:t>
+              <a:t>Location</a:t>
             </a:r>
             <a:r>
               <a:rPr lang="en-US" sz="4000" dirty="0">

</xml_diff>